<commit_message>
Fix: Add real soft-newlines (\n inserts paragraph)
</commit_message>
<xml_diff>
--- a/Template.pptx
+++ b/Template.pptx
@@ -189,7 +189,7 @@
         <p:spPr>
           <a:xfrm>
             <a:off x="0" y="554577"/>
-            <a:ext cx="12192000" cy="1004955"/>
+            <a:ext cx="12192000" cy="1030603"/>
           </a:xfrm>
           <a:prstGeom prst="rect">
             <a:avLst/>
@@ -208,7 +208,7 @@
                 <a:spcPts val="0"/>
               </a:spcBef>
               <a:spcAft>
-                <a:spcPts val="800"/>
+                <a:spcPts val="1000"/>
               </a:spcAft>
               <a:buNone/>
               <a:defRPr sz="2300">
@@ -224,7 +224,7 @@
                 <a:spcPts val="0"/>
               </a:spcBef>
               <a:spcAft>
-                <a:spcPts val="800"/>
+                <a:spcPts val="1000"/>
               </a:spcAft>
               <a:buNone/>
               <a:defRPr sz="2300">
@@ -338,7 +338,7 @@
         <p:spPr>
           <a:xfrm>
             <a:off x="0" y="0"/>
-            <a:ext cx="12192000" cy="1004955"/>
+            <a:ext cx="12192000" cy="1030603"/>
           </a:xfrm>
           <a:prstGeom prst="rect">
             <a:avLst/>
@@ -350,18 +350,12 @@
           </a:bodyPr>
           <a:lstStyle>
             <a:lvl1pPr>
-              <a:spcAft>
-                <a:spcPts val="800"/>
-              </a:spcAft>
               <a:defRPr lang="en-US" sz="2300" dirty="0">
                 <a:latin typeface="Segoe UI Semibold" panose="020B0702040204020203" pitchFamily="34" charset="0"/>
                 <a:cs typeface="Segoe UI Semibold" panose="020B0702040204020203" pitchFamily="34" charset="0"/>
               </a:defRPr>
             </a:lvl1pPr>
             <a:lvl2pPr>
-              <a:spcAft>
-                <a:spcPts val="800"/>
-              </a:spcAft>
               <a:defRPr lang="de-CH" sz="2300" dirty="0">
                 <a:latin typeface="Segoe UI Semibold" panose="020B0702040204020203" pitchFamily="34" charset="0"/>
                 <a:cs typeface="Segoe UI Semibold" panose="020B0702040204020203" pitchFamily="34" charset="0"/>
@@ -373,6 +367,9 @@
               <a:spcBef>
                 <a:spcPts val="0"/>
               </a:spcBef>
+              <a:spcAft>
+                <a:spcPts val="1000"/>
+              </a:spcAft>
             </a:pPr>
             <a:r>
               <a:rPr lang="en-US" dirty="0"/>
@@ -384,6 +381,9 @@
               <a:spcBef>
                 <a:spcPts val="0"/>
               </a:spcBef>
+              <a:spcAft>
+                <a:spcPts val="1000"/>
+              </a:spcAft>
             </a:pPr>
             <a:r>
               <a:rPr lang="en-US" dirty="0"/>
@@ -771,7 +771,7 @@
           <a:p>
             <a:fld id="{25A599A7-1540-429D-A265-2D67557613B5}" type="datetimeFigureOut">
               <a:rPr lang="de-CH" smtClean="0"/>
-              <a:t>08.06.2024</a:t>
+              <a:t>18.06.2024</a:t>
             </a:fld>
             <a:endParaRPr lang="de-CH"/>
           </a:p>
@@ -945,7 +945,7 @@
           <a:p>
             <a:fld id="{25A599A7-1540-429D-A265-2D67557613B5}" type="datetimeFigureOut">
               <a:rPr lang="de-CH" smtClean="0"/>
-              <a:t>08.06.2024</a:t>
+              <a:t>18.06.2024</a:t>
             </a:fld>
             <a:endParaRPr lang="de-CH"/>
           </a:p>
@@ -1082,7 +1082,7 @@
           <a:p>
             <a:fld id="{25A599A7-1540-429D-A265-2D67557613B5}" type="datetimeFigureOut">
               <a:rPr lang="de-CH" smtClean="0"/>
-              <a:t>08.06.2024</a:t>
+              <a:t>18.06.2024</a:t>
             </a:fld>
             <a:endParaRPr lang="de-CH"/>
           </a:p>
@@ -1428,7 +1428,7 @@
           <a:p>
             <a:fld id="{25A599A7-1540-429D-A265-2D67557613B5}" type="datetimeFigureOut">
               <a:rPr lang="de-CH" smtClean="0"/>
-              <a:t>08.06.2024</a:t>
+              <a:t>18.06.2024</a:t>
             </a:fld>
             <a:endParaRPr lang="de-CH"/>
           </a:p>
@@ -1750,7 +1750,7 @@
           <a:p>
             <a:fld id="{25A599A7-1540-429D-A265-2D67557613B5}" type="datetimeFigureOut">
               <a:rPr lang="de-CH" smtClean="0"/>
-              <a:t>08.06.2024</a:t>
+              <a:t>18.06.2024</a:t>
             </a:fld>
             <a:endParaRPr lang="de-CH"/>
           </a:p>
@@ -1990,7 +1990,7 @@
           <a:p>
             <a:fld id="{25A599A7-1540-429D-A265-2D67557613B5}" type="datetimeFigureOut">
               <a:rPr lang="de-CH" smtClean="0"/>
-              <a:t>08.06.2024</a:t>
+              <a:t>18.06.2024</a:t>
             </a:fld>
             <a:endParaRPr lang="de-CH"/>
           </a:p>
@@ -2230,7 +2230,7 @@
           <a:p>
             <a:fld id="{25A599A7-1540-429D-A265-2D67557613B5}" type="datetimeFigureOut">
               <a:rPr lang="de-CH" smtClean="0"/>
-              <a:t>08.06.2024</a:t>
+              <a:t>18.06.2024</a:t>
             </a:fld>
             <a:endParaRPr lang="de-CH"/>
           </a:p>

</xml_diff>

<commit_message>
Update template, add TODO list
</commit_message>
<xml_diff>
--- a/Template.pptx
+++ b/Template.pptx
@@ -144,8 +144,8 @@
         </p:nvSpPr>
         <p:spPr>
           <a:xfrm>
-            <a:off x="0" y="0"/>
-            <a:ext cx="12192000" cy="460375"/>
+            <a:off x="469784" y="100667"/>
+            <a:ext cx="11722216" cy="460375"/>
           </a:xfrm>
           <a:prstGeom prst="rect">
             <a:avLst/>
@@ -188,8 +188,8 @@
         </p:nvSpPr>
         <p:spPr>
           <a:xfrm>
-            <a:off x="0" y="554577"/>
-            <a:ext cx="12192000" cy="1030603"/>
+            <a:off x="469784" y="655244"/>
+            <a:ext cx="11722216" cy="1030603"/>
           </a:xfrm>
           <a:prstGeom prst="rect">
             <a:avLst/>
@@ -337,8 +337,8 @@
         </p:nvSpPr>
         <p:spPr>
           <a:xfrm>
-            <a:off x="0" y="0"/>
-            <a:ext cx="12192000" cy="1030603"/>
+            <a:off x="469784" y="83890"/>
+            <a:ext cx="11722216" cy="1030603"/>
           </a:xfrm>
           <a:prstGeom prst="rect">
             <a:avLst/>
@@ -771,7 +771,7 @@
           <a:p>
             <a:fld id="{25A599A7-1540-429D-A265-2D67557613B5}" type="datetimeFigureOut">
               <a:rPr lang="de-CH" smtClean="0"/>
-              <a:t>18.06.2024</a:t>
+              <a:t>05.07.2024</a:t>
             </a:fld>
             <a:endParaRPr lang="de-CH"/>
           </a:p>
@@ -945,7 +945,7 @@
           <a:p>
             <a:fld id="{25A599A7-1540-429D-A265-2D67557613B5}" type="datetimeFigureOut">
               <a:rPr lang="de-CH" smtClean="0"/>
-              <a:t>18.06.2024</a:t>
+              <a:t>05.07.2024</a:t>
             </a:fld>
             <a:endParaRPr lang="de-CH"/>
           </a:p>
@@ -1082,7 +1082,7 @@
           <a:p>
             <a:fld id="{25A599A7-1540-429D-A265-2D67557613B5}" type="datetimeFigureOut">
               <a:rPr lang="de-CH" smtClean="0"/>
-              <a:t>18.06.2024</a:t>
+              <a:t>05.07.2024</a:t>
             </a:fld>
             <a:endParaRPr lang="de-CH"/>
           </a:p>
@@ -1428,7 +1428,7 @@
           <a:p>
             <a:fld id="{25A599A7-1540-429D-A265-2D67557613B5}" type="datetimeFigureOut">
               <a:rPr lang="de-CH" smtClean="0"/>
-              <a:t>18.06.2024</a:t>
+              <a:t>05.07.2024</a:t>
             </a:fld>
             <a:endParaRPr lang="de-CH"/>
           </a:p>
@@ -1750,7 +1750,7 @@
           <a:p>
             <a:fld id="{25A599A7-1540-429D-A265-2D67557613B5}" type="datetimeFigureOut">
               <a:rPr lang="de-CH" smtClean="0"/>
-              <a:t>18.06.2024</a:t>
+              <a:t>05.07.2024</a:t>
             </a:fld>
             <a:endParaRPr lang="de-CH"/>
           </a:p>
@@ -1990,7 +1990,7 @@
           <a:p>
             <a:fld id="{25A599A7-1540-429D-A265-2D67557613B5}" type="datetimeFigureOut">
               <a:rPr lang="de-CH" smtClean="0"/>
-              <a:t>18.06.2024</a:t>
+              <a:t>05.07.2024</a:t>
             </a:fld>
             <a:endParaRPr lang="de-CH"/>
           </a:p>
@@ -2230,7 +2230,7 @@
           <a:p>
             <a:fld id="{25A599A7-1540-429D-A265-2D67557613B5}" type="datetimeFigureOut">
               <a:rPr lang="de-CH" smtClean="0"/>
-              <a:t>18.06.2024</a:t>
+              <a:t>05.07.2024</a:t>
             </a:fld>
             <a:endParaRPr lang="de-CH"/>
           </a:p>

</xml_diff>

<commit_message>
Add two-line mode: only two verses on one slide
</commit_message>
<xml_diff>
--- a/Template.pptx
+++ b/Template.pptx
@@ -163,10 +163,10 @@
           </a:lstStyle>
           <a:p>
             <a:r>
-              <a:rPr lang="en-US"/>
+              <a:rPr lang="en-US" dirty="0"/>
               <a:t>Click to edit Master title style</a:t>
             </a:r>
-            <a:endParaRPr lang="de-CH"/>
+            <a:endParaRPr lang="de-CH" dirty="0"/>
           </a:p>
         </p:txBody>
       </p:sp>
@@ -286,6 +286,74 @@
               <a:t>Second level</a:t>
             </a:r>
             <a:endParaRPr lang="de-CH" dirty="0"/>
+          </a:p>
+        </p:txBody>
+      </p:sp>
+      <p:sp>
+        <p:nvSpPr>
+          <p:cNvPr id="7" name="Text Placeholder 5">
+            <a:extLst>
+              <a:ext uri="{FF2B5EF4-FFF2-40B4-BE49-F238E27FC236}">
+                <a16:creationId xmlns:a16="http://schemas.microsoft.com/office/drawing/2014/main" id="{97CECBCF-7191-CC1C-3F1F-1DC0C8107CF9}"/>
+              </a:ext>
+            </a:extLst>
+          </p:cNvPr>
+          <p:cNvSpPr>
+            <a:spLocks noGrp="1"/>
+          </p:cNvSpPr>
+          <p:nvPr>
+            <p:ph type="body" sz="quarter" idx="12"/>
+          </p:nvPr>
+        </p:nvSpPr>
+        <p:spPr>
+          <a:xfrm>
+            <a:off x="469900" y="6463453"/>
+            <a:ext cx="11266488" cy="393890"/>
+          </a:xfrm>
+          <a:prstGeom prst="rect">
+            <a:avLst/>
+          </a:prstGeom>
+        </p:spPr>
+        <p:txBody>
+          <a:bodyPr vert="horz" wrap="square" lIns="91440" tIns="45720" rIns="91440" bIns="45720" rtlCol="0">
+            <a:spAutoFit/>
+          </a:bodyPr>
+          <a:lstStyle>
+            <a:lvl1pPr algn="r">
+              <a:defRPr lang="en-US" sz="1800" b="1" smtClean="0">
+                <a:latin typeface="Segoe UI Semibold" panose="020B0702040204020203" pitchFamily="34" charset="0"/>
+                <a:cs typeface="Segoe UI Semibold" panose="020B0702040204020203" pitchFamily="34" charset="0"/>
+              </a:defRPr>
+            </a:lvl1pPr>
+            <a:lvl2pPr>
+              <a:defRPr lang="en-US" sz="2300" smtClean="0">
+                <a:latin typeface="Segoe UI Semibold" panose="020B0702040204020203" pitchFamily="34" charset="0"/>
+                <a:cs typeface="Segoe UI Semibold" panose="020B0702040204020203" pitchFamily="34" charset="0"/>
+              </a:defRPr>
+            </a:lvl2pPr>
+            <a:lvl3pPr>
+              <a:defRPr lang="en-US" smtClean="0"/>
+            </a:lvl3pPr>
+            <a:lvl4pPr>
+              <a:defRPr lang="en-US" smtClean="0"/>
+            </a:lvl4pPr>
+            <a:lvl5pPr>
+              <a:defRPr lang="de-CH"/>
+            </a:lvl5pPr>
+          </a:lstStyle>
+          <a:p>
+            <a:pPr lvl="0" algn="r">
+              <a:spcBef>
+                <a:spcPts val="0"/>
+              </a:spcBef>
+              <a:spcAft>
+                <a:spcPts val="1000"/>
+              </a:spcAft>
+            </a:pPr>
+            <a:r>
+              <a:rPr lang="en-US" dirty="0"/>
+              <a:t>Click to edit Master text styles</a:t>
+            </a:r>
           </a:p>
         </p:txBody>
       </p:sp>
@@ -393,6 +461,74 @@
           </a:p>
         </p:txBody>
       </p:sp>
+      <p:sp>
+        <p:nvSpPr>
+          <p:cNvPr id="4" name="Text Placeholder 5">
+            <a:extLst>
+              <a:ext uri="{FF2B5EF4-FFF2-40B4-BE49-F238E27FC236}">
+                <a16:creationId xmlns:a16="http://schemas.microsoft.com/office/drawing/2014/main" id="{7F10244B-A4D2-BF49-E635-0EC47F4BD919}"/>
+              </a:ext>
+            </a:extLst>
+          </p:cNvPr>
+          <p:cNvSpPr>
+            <a:spLocks noGrp="1"/>
+          </p:cNvSpPr>
+          <p:nvPr>
+            <p:ph type="body" sz="quarter" idx="11"/>
+          </p:nvPr>
+        </p:nvSpPr>
+        <p:spPr>
+          <a:xfrm>
+            <a:off x="469900" y="6463453"/>
+            <a:ext cx="11266488" cy="393890"/>
+          </a:xfrm>
+          <a:prstGeom prst="rect">
+            <a:avLst/>
+          </a:prstGeom>
+        </p:spPr>
+        <p:txBody>
+          <a:bodyPr vert="horz" wrap="square" lIns="91440" tIns="45720" rIns="91440" bIns="45720" rtlCol="0">
+            <a:spAutoFit/>
+          </a:bodyPr>
+          <a:lstStyle>
+            <a:lvl1pPr algn="r">
+              <a:defRPr lang="en-US" sz="1800" b="1" smtClean="0">
+                <a:latin typeface="Segoe UI Semibold" panose="020B0702040204020203" pitchFamily="34" charset="0"/>
+                <a:cs typeface="Segoe UI Semibold" panose="020B0702040204020203" pitchFamily="34" charset="0"/>
+              </a:defRPr>
+            </a:lvl1pPr>
+            <a:lvl2pPr>
+              <a:defRPr lang="en-US" sz="2300" smtClean="0">
+                <a:latin typeface="Segoe UI Semibold" panose="020B0702040204020203" pitchFamily="34" charset="0"/>
+                <a:cs typeface="Segoe UI Semibold" panose="020B0702040204020203" pitchFamily="34" charset="0"/>
+              </a:defRPr>
+            </a:lvl2pPr>
+            <a:lvl3pPr>
+              <a:defRPr lang="en-US" smtClean="0"/>
+            </a:lvl3pPr>
+            <a:lvl4pPr>
+              <a:defRPr lang="en-US" smtClean="0"/>
+            </a:lvl4pPr>
+            <a:lvl5pPr>
+              <a:defRPr lang="de-CH"/>
+            </a:lvl5pPr>
+          </a:lstStyle>
+          <a:p>
+            <a:pPr lvl="0" algn="r">
+              <a:spcBef>
+                <a:spcPts val="0"/>
+              </a:spcBef>
+              <a:spcAft>
+                <a:spcPts val="1000"/>
+              </a:spcAft>
+            </a:pPr>
+            <a:r>
+              <a:rPr lang="en-US" dirty="0"/>
+              <a:t>Click to edit Master text styles</a:t>
+            </a:r>
+          </a:p>
+        </p:txBody>
+      </p:sp>
     </p:spTree>
     <p:extLst>
       <p:ext uri="{BB962C8B-B14F-4D97-AF65-F5344CB8AC3E}">
@@ -771,7 +907,7 @@
           <a:p>
             <a:fld id="{25A599A7-1540-429D-A265-2D67557613B5}" type="datetimeFigureOut">
               <a:rPr lang="de-CH" smtClean="0"/>
-              <a:t>05.07.2024</a:t>
+              <a:t>22.09.2025</a:t>
             </a:fld>
             <a:endParaRPr lang="de-CH"/>
           </a:p>
@@ -945,7 +1081,7 @@
           <a:p>
             <a:fld id="{25A599A7-1540-429D-A265-2D67557613B5}" type="datetimeFigureOut">
               <a:rPr lang="de-CH" smtClean="0"/>
-              <a:t>05.07.2024</a:t>
+              <a:t>22.09.2025</a:t>
             </a:fld>
             <a:endParaRPr lang="de-CH"/>
           </a:p>
@@ -1082,7 +1218,7 @@
           <a:p>
             <a:fld id="{25A599A7-1540-429D-A265-2D67557613B5}" type="datetimeFigureOut">
               <a:rPr lang="de-CH" smtClean="0"/>
-              <a:t>05.07.2024</a:t>
+              <a:t>22.09.2025</a:t>
             </a:fld>
             <a:endParaRPr lang="de-CH"/>
           </a:p>
@@ -1428,7 +1564,7 @@
           <a:p>
             <a:fld id="{25A599A7-1540-429D-A265-2D67557613B5}" type="datetimeFigureOut">
               <a:rPr lang="de-CH" smtClean="0"/>
-              <a:t>05.07.2024</a:t>
+              <a:t>22.09.2025</a:t>
             </a:fld>
             <a:endParaRPr lang="de-CH"/>
           </a:p>
@@ -1750,7 +1886,7 @@
           <a:p>
             <a:fld id="{25A599A7-1540-429D-A265-2D67557613B5}" type="datetimeFigureOut">
               <a:rPr lang="de-CH" smtClean="0"/>
-              <a:t>05.07.2024</a:t>
+              <a:t>22.09.2025</a:t>
             </a:fld>
             <a:endParaRPr lang="de-CH"/>
           </a:p>
@@ -1990,7 +2126,7 @@
           <a:p>
             <a:fld id="{25A599A7-1540-429D-A265-2D67557613B5}" type="datetimeFigureOut">
               <a:rPr lang="de-CH" smtClean="0"/>
-              <a:t>05.07.2024</a:t>
+              <a:t>22.09.2025</a:t>
             </a:fld>
             <a:endParaRPr lang="de-CH"/>
           </a:p>
@@ -2230,7 +2366,7 @@
           <a:p>
             <a:fld id="{25A599A7-1540-429D-A265-2D67557613B5}" type="datetimeFigureOut">
               <a:rPr lang="de-CH" smtClean="0"/>
-              <a:t>05.07.2024</a:t>
+              <a:t>22.09.2025</a:t>
             </a:fld>
             <a:endParaRPr lang="de-CH"/>
           </a:p>

</xml_diff>